<commit_message>
Update the opengl getting started..........
</commit_message>
<xml_diff>
--- a/Materials/opengl/OPEN GL GETTING STARTED.pptx
+++ b/Materials/opengl/OPEN GL GETTING STARTED.pptx
@@ -153,6 +153,9 @@
         </p14:section>
       </p14:sectionLst>
     </p:ext>
+    <p:ext uri="{EFAFB233-063F-42B5-8137-9DF3F51BA10A}">
+      <p15:sldGuideLst xmlns:p15="http://schemas.microsoft.com/office/powerpoint/2012/main"/>
+    </p:ext>
   </p:extLst>
 </p:presentation>
 </file>
@@ -239,7 +242,7 @@
           <a:p>
             <a:fld id="{DEB83075-ED46-4CA5-AA00-EA82A677DC91}" type="datetimeFigureOut">
               <a:rPr lang="en-US" smtClean="0"/>
-              <a:t>3/8/2014</a:t>
+              <a:t>3/9/2014</a:t>
             </a:fld>
             <a:endParaRPr lang="en-US"/>
           </a:p>
@@ -1167,7 +1170,7 @@
           <a:p>
             <a:fld id="{F9B31B00-EF1A-498E-8D07-9C22163EB3F5}" type="datetimeFigureOut">
               <a:rPr lang="en-US" smtClean="0"/>
-              <a:t>3/8/2014</a:t>
+              <a:t>3/9/2014</a:t>
             </a:fld>
             <a:endParaRPr lang="en-US"/>
           </a:p>
@@ -1337,7 +1340,7 @@
           <a:p>
             <a:fld id="{F9B31B00-EF1A-498E-8D07-9C22163EB3F5}" type="datetimeFigureOut">
               <a:rPr lang="en-US" smtClean="0"/>
-              <a:t>3/8/2014</a:t>
+              <a:t>3/9/2014</a:t>
             </a:fld>
             <a:endParaRPr lang="en-US"/>
           </a:p>
@@ -1517,7 +1520,7 @@
           <a:p>
             <a:fld id="{F9B31B00-EF1A-498E-8D07-9C22163EB3F5}" type="datetimeFigureOut">
               <a:rPr lang="en-US" smtClean="0"/>
-              <a:t>3/8/2014</a:t>
+              <a:t>3/9/2014</a:t>
             </a:fld>
             <a:endParaRPr lang="en-US"/>
           </a:p>
@@ -1687,7 +1690,7 @@
           <a:p>
             <a:fld id="{F9B31B00-EF1A-498E-8D07-9C22163EB3F5}" type="datetimeFigureOut">
               <a:rPr lang="en-US" smtClean="0"/>
-              <a:t>3/8/2014</a:t>
+              <a:t>3/9/2014</a:t>
             </a:fld>
             <a:endParaRPr lang="en-US"/>
           </a:p>
@@ -1933,7 +1936,7 @@
           <a:p>
             <a:fld id="{F9B31B00-EF1A-498E-8D07-9C22163EB3F5}" type="datetimeFigureOut">
               <a:rPr lang="en-US" smtClean="0"/>
-              <a:t>3/8/2014</a:t>
+              <a:t>3/9/2014</a:t>
             </a:fld>
             <a:endParaRPr lang="en-US"/>
           </a:p>
@@ -2165,7 +2168,7 @@
           <a:p>
             <a:fld id="{F9B31B00-EF1A-498E-8D07-9C22163EB3F5}" type="datetimeFigureOut">
               <a:rPr lang="en-US" smtClean="0"/>
-              <a:t>3/8/2014</a:t>
+              <a:t>3/9/2014</a:t>
             </a:fld>
             <a:endParaRPr lang="en-US"/>
           </a:p>
@@ -2532,7 +2535,7 @@
           <a:p>
             <a:fld id="{F9B31B00-EF1A-498E-8D07-9C22163EB3F5}" type="datetimeFigureOut">
               <a:rPr lang="en-US" smtClean="0"/>
-              <a:t>3/8/2014</a:t>
+              <a:t>3/9/2014</a:t>
             </a:fld>
             <a:endParaRPr lang="en-US"/>
           </a:p>
@@ -2650,7 +2653,7 @@
           <a:p>
             <a:fld id="{F9B31B00-EF1A-498E-8D07-9C22163EB3F5}" type="datetimeFigureOut">
               <a:rPr lang="en-US" smtClean="0"/>
-              <a:t>3/8/2014</a:t>
+              <a:t>3/9/2014</a:t>
             </a:fld>
             <a:endParaRPr lang="en-US"/>
           </a:p>
@@ -2745,7 +2748,7 @@
           <a:p>
             <a:fld id="{F9B31B00-EF1A-498E-8D07-9C22163EB3F5}" type="datetimeFigureOut">
               <a:rPr lang="en-US" smtClean="0"/>
-              <a:t>3/8/2014</a:t>
+              <a:t>3/9/2014</a:t>
             </a:fld>
             <a:endParaRPr lang="en-US"/>
           </a:p>
@@ -3022,7 +3025,7 @@
           <a:p>
             <a:fld id="{F9B31B00-EF1A-498E-8D07-9C22163EB3F5}" type="datetimeFigureOut">
               <a:rPr lang="en-US" smtClean="0"/>
-              <a:t>3/8/2014</a:t>
+              <a:t>3/9/2014</a:t>
             </a:fld>
             <a:endParaRPr lang="en-US"/>
           </a:p>
@@ -3275,7 +3278,7 @@
           <a:p>
             <a:fld id="{F9B31B00-EF1A-498E-8D07-9C22163EB3F5}" type="datetimeFigureOut">
               <a:rPr lang="en-US" smtClean="0"/>
-              <a:t>3/8/2014</a:t>
+              <a:t>3/9/2014</a:t>
             </a:fld>
             <a:endParaRPr lang="en-US"/>
           </a:p>
@@ -3488,7 +3491,7 @@
           <a:p>
             <a:fld id="{F9B31B00-EF1A-498E-8D07-9C22163EB3F5}" type="datetimeFigureOut">
               <a:rPr lang="en-US" smtClean="0"/>
-              <a:t>3/8/2014</a:t>
+              <a:t>3/9/2014</a:t>
             </a:fld>
             <a:endParaRPr lang="en-US"/>
           </a:p>
@@ -5160,12 +5163,19 @@
             <a:spLocks noGrp="1"/>
           </p:cNvSpPr>
           <p:nvPr>
-            <p:ph idx="1"/>
-          </p:nvPr>
-        </p:nvSpPr>
-        <p:spPr/>
-        <p:txBody>
-          <a:bodyPr/>
+            <p:ph type="subTitle" idx="4294967295"/>
+          </p:nvPr>
+        </p:nvSpPr>
+        <p:spPr>
+          <a:xfrm>
+            <a:off x="0" y="3602038"/>
+            <a:ext cx="9144000" cy="1655762"/>
+          </a:xfrm>
+        </p:spPr>
+        <p:txBody>
+          <a:bodyPr>
+            <a:normAutofit fontScale="92500" lnSpcReduction="20000"/>
+          </a:bodyPr>
           <a:lstStyle/>
           <a:p>
             <a:pPr marL="0" indent="0">

</xml_diff>